<commit_message>
Added my email address.
</commit_message>
<xml_diff>
--- a/DotNETWorkflows.pptx
+++ b/DotNETWorkflows.pptx
@@ -12697,6 +12697,50 @@
           </a:p>
         </p:txBody>
       </p:sp>
+      <p:sp>
+        <p:nvSpPr>
+          <p:cNvPr id="8" name="TextBox 7">
+            <a:extLst>
+              <a:ext uri="{FF2B5EF4-FFF2-40B4-BE49-F238E27FC236}">
+                <a16:creationId xmlns:a16="http://schemas.microsoft.com/office/drawing/2014/main" id="{E47DC0B5-2872-4EAA-AC8F-E474505B518A}"/>
+              </a:ext>
+            </a:extLst>
+          </p:cNvPr>
+          <p:cNvSpPr txBox="1"/>
+          <p:nvPr/>
+        </p:nvSpPr>
+        <p:spPr>
+          <a:xfrm>
+            <a:off x="2734811" y="5244306"/>
+            <a:ext cx="1342034" cy="369332"/>
+          </a:xfrm>
+          <a:prstGeom prst="rect">
+            <a:avLst/>
+          </a:prstGeom>
+          <a:noFill/>
+        </p:spPr>
+        <p:txBody>
+          <a:bodyPr wrap="none" rtlCol="0">
+            <a:spAutoFit/>
+          </a:bodyPr>
+          <a:lstStyle/>
+          <a:p>
+            <a:r>
+              <a:rPr lang="en-US" dirty="0">
+                <a:hlinkClick r:id="rId6"/>
+              </a:rPr>
+              <a:t>Bill </a:t>
+            </a:r>
+            <a:r>
+              <a:rPr lang="en-US" dirty="0" err="1">
+                <a:hlinkClick r:id="rId6"/>
+              </a:rPr>
+              <a:t>holman</a:t>
+            </a:r>
+            <a:endParaRPr lang="en-US" dirty="0"/>
+          </a:p>
+        </p:txBody>
+      </p:sp>
     </p:spTree>
     <p:extLst>
       <p:ext uri="{BB962C8B-B14F-4D97-AF65-F5344CB8AC3E}">

</xml_diff>